<commit_message>
updated reports and ipynb
</commit_message>
<xml_diff>
--- a/project_report/project_presentation_I.pptx
+++ b/project_report/project_presentation_I.pptx
@@ -220,7 +220,7 @@
           <a:p>
             <a:fld id="{8C5409F7-8A42-334A-9A35-CDCD26D8F5B6}" type="datetimeFigureOut">
               <a:rPr lang="en-US" smtClean="0"/>
-              <a:t>6/30/18</a:t>
+              <a:t>8/25/18</a:t>
             </a:fld>
             <a:endParaRPr lang="en-US"/>
           </a:p>
@@ -386,7 +386,7 @@
           <a:p>
             <a:fld id="{88D627A7-C818-CC46-BF9E-FFCBC18694EF}" type="datetimeFigureOut">
               <a:rPr lang="en-US" smtClean="0"/>
-              <a:t>6/30/18</a:t>
+              <a:t>8/25/18</a:t>
             </a:fld>
             <a:endParaRPr lang="en-US"/>
           </a:p>
@@ -1044,9 +1044,9 @@
           <a:bodyPr/>
           <a:lstStyle/>
           <a:p>
-            <a:fld id="{1DE16B7A-8F59-8D49-BDDE-C30A4662DF63}" type="datetime1">
-              <a:rPr lang="en-US" smtClean="0"/>
-              <a:t>6/30/18</a:t>
+            <a:fld id="{9ED67D8B-CCD5-2342-A7AA-67D094EF2EF8}" type="datetime1">
+              <a:rPr lang="en-US" smtClean="0"/>
+              <a:t>8/25/18</a:t>
             </a:fld>
             <a:endParaRPr lang="en-US"/>
           </a:p>
@@ -1069,7 +1069,7 @@
           <a:p>
             <a:r>
               <a:rPr lang="en-US" smtClean="0"/>
-              <a:t>springboard capstone project - I</a:t>
+              <a:t>Bike Sharing Prediction</a:t>
             </a:r>
             <a:endParaRPr lang="en-US"/>
           </a:p>
@@ -1226,9 +1226,9 @@
           <a:bodyPr/>
           <a:lstStyle/>
           <a:p>
-            <a:fld id="{35CDE18B-8933-F748-AD93-76E8F4890288}" type="datetime1">
-              <a:rPr lang="en-US" smtClean="0"/>
-              <a:t>6/30/18</a:t>
+            <a:fld id="{AE85BFFD-93BF-D449-97E1-9707A0DBAA28}" type="datetime1">
+              <a:rPr lang="en-US" smtClean="0"/>
+              <a:t>8/25/18</a:t>
             </a:fld>
             <a:endParaRPr lang="en-US"/>
           </a:p>
@@ -1251,7 +1251,7 @@
           <a:p>
             <a:r>
               <a:rPr lang="en-US" smtClean="0"/>
-              <a:t>springboard capstone project - I</a:t>
+              <a:t>Bike Sharing Prediction</a:t>
             </a:r>
             <a:endParaRPr lang="en-US"/>
           </a:p>
@@ -1418,9 +1418,9 @@
           <a:bodyPr/>
           <a:lstStyle/>
           <a:p>
-            <a:fld id="{DEF5E011-D49E-0941-B5D3-6D830CD4C789}" type="datetime1">
-              <a:rPr lang="en-US" smtClean="0"/>
-              <a:t>6/30/18</a:t>
+            <a:fld id="{F5E4DA23-B0C1-6645-9D35-2E1F0B36B7F4}" type="datetime1">
+              <a:rPr lang="en-US" smtClean="0"/>
+              <a:t>8/25/18</a:t>
             </a:fld>
             <a:endParaRPr lang="en-US"/>
           </a:p>
@@ -1443,7 +1443,7 @@
           <a:p>
             <a:r>
               <a:rPr lang="en-US" smtClean="0"/>
-              <a:t>springboard capstone project - I</a:t>
+              <a:t>Bike Sharing Prediction</a:t>
             </a:r>
             <a:endParaRPr lang="en-US"/>
           </a:p>
@@ -1614,9 +1614,9 @@
           <a:bodyPr/>
           <a:lstStyle/>
           <a:p>
-            <a:fld id="{F8C80C10-3DE3-5646-932E-22828465665E}" type="datetime1">
-              <a:rPr lang="en-US" smtClean="0"/>
-              <a:t>6/30/18</a:t>
+            <a:fld id="{B8181340-D94B-5F45-8C47-8750ECE6626B}" type="datetime1">
+              <a:rPr lang="en-US" smtClean="0"/>
+              <a:t>8/25/18</a:t>
             </a:fld>
             <a:endParaRPr lang="en-US"/>
           </a:p>
@@ -1639,7 +1639,7 @@
           <a:p>
             <a:r>
               <a:rPr lang="en-US" smtClean="0"/>
-              <a:t>springboard capstone project - I</a:t>
+              <a:t>Bike Sharing Prediction</a:t>
             </a:r>
             <a:endParaRPr lang="en-US"/>
           </a:p>
@@ -1790,9 +1790,9 @@
           <a:bodyPr/>
           <a:lstStyle/>
           <a:p>
-            <a:fld id="{54976B97-139E-8140-9501-B81258BA356B}" type="datetime1">
-              <a:rPr lang="en-US" smtClean="0"/>
-              <a:t>6/30/18</a:t>
+            <a:fld id="{361DA2BC-99D5-3043-8469-F1E7C6699309}" type="datetime1">
+              <a:rPr lang="en-US" smtClean="0"/>
+              <a:t>8/25/18</a:t>
             </a:fld>
             <a:endParaRPr lang="en-US"/>
           </a:p>
@@ -1815,7 +1815,7 @@
           <a:p>
             <a:r>
               <a:rPr lang="en-US" smtClean="0"/>
-              <a:t>springboard capstone project - I</a:t>
+              <a:t>Bike Sharing Prediction</a:t>
             </a:r>
             <a:endParaRPr lang="en-US"/>
           </a:p>
@@ -2042,9 +2042,9 @@
           <a:bodyPr/>
           <a:lstStyle/>
           <a:p>
-            <a:fld id="{44D389EB-5F37-D94A-A715-7BC2C2DB693D}" type="datetime1">
-              <a:rPr lang="en-US" smtClean="0"/>
-              <a:t>6/30/18</a:t>
+            <a:fld id="{2FEEFEA5-3062-E744-B224-C9CCBA56ACBF}" type="datetime1">
+              <a:rPr lang="en-US" smtClean="0"/>
+              <a:t>8/25/18</a:t>
             </a:fld>
             <a:endParaRPr lang="en-US"/>
           </a:p>
@@ -2067,7 +2067,7 @@
           <a:p>
             <a:r>
               <a:rPr lang="en-US" smtClean="0"/>
-              <a:t>springboard capstone project - I</a:t>
+              <a:t>Bike Sharing Prediction</a:t>
             </a:r>
             <a:endParaRPr lang="en-US"/>
           </a:p>
@@ -2273,9 +2273,9 @@
           <a:bodyPr/>
           <a:lstStyle/>
           <a:p>
-            <a:fld id="{AD426A52-8A13-1447-8010-36E3AA17560A}" type="datetime1">
-              <a:rPr lang="en-US" smtClean="0"/>
-              <a:t>6/30/18</a:t>
+            <a:fld id="{4A47F98A-C5E6-DC4A-BA82-9F067EB62AED}" type="datetime1">
+              <a:rPr lang="en-US" smtClean="0"/>
+              <a:t>8/25/18</a:t>
             </a:fld>
             <a:endParaRPr lang="en-US"/>
           </a:p>
@@ -2298,7 +2298,7 @@
           <a:p>
             <a:r>
               <a:rPr lang="en-US" smtClean="0"/>
-              <a:t>springboard capstone project - I</a:t>
+              <a:t>Bike Sharing Prediction</a:t>
             </a:r>
             <a:endParaRPr lang="en-US"/>
           </a:p>
@@ -2646,9 +2646,9 @@
           <a:bodyPr/>
           <a:lstStyle/>
           <a:p>
-            <a:fld id="{045B1E73-3410-7648-ADB4-DC12A2205A15}" type="datetime1">
-              <a:rPr lang="en-US" smtClean="0"/>
-              <a:t>6/30/18</a:t>
+            <a:fld id="{23C51F77-409F-F440-B611-2D2C828BD592}" type="datetime1">
+              <a:rPr lang="en-US" smtClean="0"/>
+              <a:t>8/25/18</a:t>
             </a:fld>
             <a:endParaRPr lang="en-US"/>
           </a:p>
@@ -2671,7 +2671,7 @@
           <a:p>
             <a:r>
               <a:rPr lang="en-US" smtClean="0"/>
-              <a:t>springboard capstone project - I</a:t>
+              <a:t>Bike Sharing Prediction</a:t>
             </a:r>
             <a:endParaRPr lang="en-US"/>
           </a:p>
@@ -2770,9 +2770,9 @@
           <a:bodyPr/>
           <a:lstStyle/>
           <a:p>
-            <a:fld id="{A453D074-DB0F-B347-B37A-DF94F6702CEF}" type="datetime1">
-              <a:rPr lang="en-US" smtClean="0"/>
-              <a:t>6/30/18</a:t>
+            <a:fld id="{4EE56ADC-96D1-174F-842E-85BE8672B661}" type="datetime1">
+              <a:rPr lang="en-US" smtClean="0"/>
+              <a:t>8/25/18</a:t>
             </a:fld>
             <a:endParaRPr lang="en-US"/>
           </a:p>
@@ -2795,7 +2795,7 @@
           <a:p>
             <a:r>
               <a:rPr lang="en-US" smtClean="0"/>
-              <a:t>springboard capstone project - I</a:t>
+              <a:t>Bike Sharing Prediction</a:t>
             </a:r>
             <a:endParaRPr lang="en-US"/>
           </a:p>
@@ -2895,9 +2895,9 @@
           <a:bodyPr/>
           <a:lstStyle/>
           <a:p>
-            <a:fld id="{A453D074-DB0F-B347-B37A-DF94F6702CEF}" type="datetime1">
-              <a:rPr lang="en-US" smtClean="0"/>
-              <a:t>6/30/18</a:t>
+            <a:fld id="{0EEC02BA-4F02-B74F-8BC3-CEE5B1BB6AF2}" type="datetime1">
+              <a:rPr lang="en-US" smtClean="0"/>
+              <a:t>8/25/18</a:t>
             </a:fld>
             <a:endParaRPr lang="en-US"/>
           </a:p>
@@ -2920,7 +2920,7 @@
           <a:p>
             <a:r>
               <a:rPr lang="en-US" smtClean="0"/>
-              <a:t>springboard capstone project - I</a:t>
+              <a:t>Bike Sharing Prediction</a:t>
             </a:r>
             <a:endParaRPr lang="en-US"/>
           </a:p>
@@ -3020,9 +3020,9 @@
           <a:bodyPr/>
           <a:lstStyle/>
           <a:p>
-            <a:fld id="{5A8073D3-C7BC-D643-B99C-2708432ECFAA}" type="datetime1">
-              <a:rPr lang="en-US" smtClean="0"/>
-              <a:t>6/30/18</a:t>
+            <a:fld id="{FA9FD25D-0E06-2444-8D52-DD14DAC70A01}" type="datetime1">
+              <a:rPr lang="en-US" smtClean="0"/>
+              <a:t>8/25/18</a:t>
             </a:fld>
             <a:endParaRPr lang="en-US"/>
           </a:p>
@@ -3045,7 +3045,7 @@
           <a:p>
             <a:r>
               <a:rPr lang="en-US" smtClean="0"/>
-              <a:t>springboard capstone project - I</a:t>
+              <a:t>Bike Sharing Prediction</a:t>
             </a:r>
             <a:endParaRPr lang="en-US"/>
           </a:p>
@@ -3197,9 +3197,9 @@
           <a:bodyPr/>
           <a:lstStyle/>
           <a:p>
-            <a:fld id="{E9DFA6A9-26D3-624E-B792-461E0FDBA8B2}" type="datetime1">
-              <a:rPr lang="en-US" smtClean="0"/>
-              <a:t>6/30/18</a:t>
+            <a:fld id="{AE60F419-F132-3C48-97A9-22E2F6C64F78}" type="datetime1">
+              <a:rPr lang="en-US" smtClean="0"/>
+              <a:t>8/25/18</a:t>
             </a:fld>
             <a:endParaRPr lang="en-US"/>
           </a:p>
@@ -3222,7 +3222,7 @@
           <a:p>
             <a:r>
               <a:rPr lang="en-US" smtClean="0"/>
-              <a:t>springboard capstone project - I</a:t>
+              <a:t>Bike Sharing Prediction</a:t>
             </a:r>
             <a:endParaRPr lang="en-US"/>
           </a:p>
@@ -3296,9 +3296,9 @@
           <a:bodyPr/>
           <a:lstStyle/>
           <a:p>
-            <a:fld id="{2DED4779-B2D0-9143-AA2B-A5F112B41723}" type="datetime1">
-              <a:rPr lang="en-US" smtClean="0"/>
-              <a:t>6/30/18</a:t>
+            <a:fld id="{7D2AADF7-77B1-5541-B82B-E79DA4A95717}" type="datetime1">
+              <a:rPr lang="en-US" smtClean="0"/>
+              <a:t>8/25/18</a:t>
             </a:fld>
             <a:endParaRPr lang="en-US"/>
           </a:p>
@@ -3321,7 +3321,7 @@
           <a:p>
             <a:r>
               <a:rPr lang="en-US" smtClean="0"/>
-              <a:t>springboard capstone project - I</a:t>
+              <a:t>Bike Sharing Prediction</a:t>
             </a:r>
             <a:endParaRPr lang="en-US"/>
           </a:p>
@@ -3572,9 +3572,9 @@
           <a:bodyPr/>
           <a:lstStyle/>
           <a:p>
-            <a:fld id="{ACAA0147-13BE-114C-9BE0-9DBF4ED131DB}" type="datetime1">
-              <a:rPr lang="en-US" smtClean="0"/>
-              <a:t>6/30/18</a:t>
+            <a:fld id="{2A378599-E85B-8A4E-B402-470F8E3669AD}" type="datetime1">
+              <a:rPr lang="en-US" smtClean="0"/>
+              <a:t>8/25/18</a:t>
             </a:fld>
             <a:endParaRPr lang="en-US"/>
           </a:p>
@@ -3597,7 +3597,7 @@
           <a:p>
             <a:r>
               <a:rPr lang="en-US" smtClean="0"/>
-              <a:t>springboard capstone project - I</a:t>
+              <a:t>Bike Sharing Prediction</a:t>
             </a:r>
             <a:endParaRPr lang="en-US"/>
           </a:p>
@@ -3828,9 +3828,9 @@
           <a:bodyPr/>
           <a:lstStyle/>
           <a:p>
-            <a:fld id="{3A00A78E-52A2-BF45-983A-0D962D3BA694}" type="datetime1">
-              <a:rPr lang="en-US" smtClean="0"/>
-              <a:t>6/30/18</a:t>
+            <a:fld id="{9EA7EDA5-81F8-A24B-9928-FC83CE8D42AB}" type="datetime1">
+              <a:rPr lang="en-US" smtClean="0"/>
+              <a:t>8/25/18</a:t>
             </a:fld>
             <a:endParaRPr lang="en-US"/>
           </a:p>
@@ -3853,7 +3853,7 @@
           <a:p>
             <a:r>
               <a:rPr lang="en-US" smtClean="0"/>
-              <a:t>springboard capstone project - I</a:t>
+              <a:t>Bike Sharing Prediction</a:t>
             </a:r>
             <a:endParaRPr lang="en-US"/>
           </a:p>
@@ -3997,9 +3997,9 @@
           <a:bodyPr/>
           <a:lstStyle/>
           <a:p>
-            <a:fld id="{BE7545DC-FB8A-0941-85CD-A4324F15E264}" type="datetime1">
-              <a:rPr lang="en-US" smtClean="0"/>
-              <a:t>6/30/18</a:t>
+            <a:fld id="{C56EEF2A-5FDA-D744-BB63-DDAE8EC51726}" type="datetime1">
+              <a:rPr lang="en-US" smtClean="0"/>
+              <a:t>8/25/18</a:t>
             </a:fld>
             <a:endParaRPr lang="en-US"/>
           </a:p>
@@ -4022,7 +4022,7 @@
           <a:p>
             <a:r>
               <a:rPr lang="en-US" smtClean="0"/>
-              <a:t>springboard capstone project - I</a:t>
+              <a:t>Bike Sharing Prediction</a:t>
             </a:r>
             <a:endParaRPr lang="en-US"/>
           </a:p>
@@ -4176,9 +4176,9 @@
           <a:bodyPr/>
           <a:lstStyle/>
           <a:p>
-            <a:fld id="{C09AAB36-7D31-7C48-87E1-74C9674B3B15}" type="datetime1">
-              <a:rPr lang="en-US" smtClean="0"/>
-              <a:t>6/30/18</a:t>
+            <a:fld id="{D5E7C369-69CA-0743-9501-ABF96B414866}" type="datetime1">
+              <a:rPr lang="en-US" smtClean="0"/>
+              <a:t>8/25/18</a:t>
             </a:fld>
             <a:endParaRPr lang="en-US"/>
           </a:p>
@@ -4201,7 +4201,7 @@
           <a:p>
             <a:r>
               <a:rPr lang="en-US" smtClean="0"/>
-              <a:t>springboard capstone project - I</a:t>
+              <a:t>Bike Sharing Prediction</a:t>
             </a:r>
             <a:endParaRPr lang="en-US"/>
           </a:p>
@@ -4367,9 +4367,9 @@
           <a:bodyPr/>
           <a:lstStyle/>
           <a:p>
-            <a:fld id="{C796A040-D99B-734F-824A-C42646506EF6}" type="datetimeFigureOut">
-              <a:rPr lang="en-US" smtClean="0"/>
-              <a:t>6/30/18</a:t>
+            <a:fld id="{014A95A3-19A7-0D40-A4B3-59BD6EB04BA3}" type="datetime1">
+              <a:rPr lang="en-US" smtClean="0"/>
+              <a:t>8/25/18</a:t>
             </a:fld>
             <a:endParaRPr lang="en-US"/>
           </a:p>
@@ -4390,6 +4390,10 @@
           <a:bodyPr/>
           <a:lstStyle/>
           <a:p>
+            <a:r>
+              <a:rPr lang="en-US" smtClean="0"/>
+              <a:t>Bike Sharing Prediction</a:t>
+            </a:r>
             <a:endParaRPr lang="en-US"/>
           </a:p>
         </p:txBody>
@@ -4537,9 +4541,9 @@
           <a:bodyPr/>
           <a:lstStyle/>
           <a:p>
-            <a:fld id="{C796A040-D99B-734F-824A-C42646506EF6}" type="datetimeFigureOut">
-              <a:rPr lang="en-US" smtClean="0"/>
-              <a:t>6/30/18</a:t>
+            <a:fld id="{1170179F-915F-704E-9B99-CCF27F668134}" type="datetime1">
+              <a:rPr lang="en-US" smtClean="0"/>
+              <a:t>8/25/18</a:t>
             </a:fld>
             <a:endParaRPr lang="en-US"/>
           </a:p>
@@ -4560,6 +4564,10 @@
           <a:bodyPr/>
           <a:lstStyle/>
           <a:p>
+            <a:r>
+              <a:rPr lang="en-US" smtClean="0"/>
+              <a:t>Bike Sharing Prediction</a:t>
+            </a:r>
             <a:endParaRPr lang="en-US"/>
           </a:p>
         </p:txBody>
@@ -4783,9 +4791,9 @@
           <a:bodyPr/>
           <a:lstStyle/>
           <a:p>
-            <a:fld id="{C796A040-D99B-734F-824A-C42646506EF6}" type="datetimeFigureOut">
-              <a:rPr lang="en-US" smtClean="0"/>
-              <a:t>6/30/18</a:t>
+            <a:fld id="{5ADC5C1C-482B-9146-8129-C2779D9068CB}" type="datetime1">
+              <a:rPr lang="en-US" smtClean="0"/>
+              <a:t>8/25/18</a:t>
             </a:fld>
             <a:endParaRPr lang="en-US"/>
           </a:p>
@@ -4806,6 +4814,10 @@
           <a:bodyPr/>
           <a:lstStyle/>
           <a:p>
+            <a:r>
+              <a:rPr lang="en-US" smtClean="0"/>
+              <a:t>Bike Sharing Prediction</a:t>
+            </a:r>
             <a:endParaRPr lang="en-US"/>
           </a:p>
         </p:txBody>
@@ -5015,9 +5027,9 @@
           <a:bodyPr/>
           <a:lstStyle/>
           <a:p>
-            <a:fld id="{C796A040-D99B-734F-824A-C42646506EF6}" type="datetimeFigureOut">
-              <a:rPr lang="en-US" smtClean="0"/>
-              <a:t>6/30/18</a:t>
+            <a:fld id="{2B7D6FE8-EC7F-3146-A220-17408261FEAB}" type="datetime1">
+              <a:rPr lang="en-US" smtClean="0"/>
+              <a:t>8/25/18</a:t>
             </a:fld>
             <a:endParaRPr lang="en-US"/>
           </a:p>
@@ -5038,6 +5050,10 @@
           <a:bodyPr/>
           <a:lstStyle/>
           <a:p>
+            <a:r>
+              <a:rPr lang="en-US" smtClean="0"/>
+              <a:t>Bike Sharing Prediction</a:t>
+            </a:r>
             <a:endParaRPr lang="en-US"/>
           </a:p>
         </p:txBody>
@@ -5382,9 +5398,9 @@
           <a:bodyPr/>
           <a:lstStyle/>
           <a:p>
-            <a:fld id="{C796A040-D99B-734F-824A-C42646506EF6}" type="datetimeFigureOut">
-              <a:rPr lang="en-US" smtClean="0"/>
-              <a:t>6/30/18</a:t>
+            <a:fld id="{5CB389A4-EABB-E94F-9892-77D20DB8C039}" type="datetime1">
+              <a:rPr lang="en-US" smtClean="0"/>
+              <a:t>8/25/18</a:t>
             </a:fld>
             <a:endParaRPr lang="en-US"/>
           </a:p>
@@ -5405,6 +5421,10 @@
           <a:bodyPr/>
           <a:lstStyle/>
           <a:p>
+            <a:r>
+              <a:rPr lang="en-US" smtClean="0"/>
+              <a:t>Bike Sharing Prediction</a:t>
+            </a:r>
             <a:endParaRPr lang="en-US"/>
           </a:p>
         </p:txBody>
@@ -5636,9 +5656,9 @@
           <a:bodyPr/>
           <a:lstStyle/>
           <a:p>
-            <a:fld id="{0329579A-BDB5-6541-AD8B-179F0770DB9D}" type="datetime1">
-              <a:rPr lang="en-US" smtClean="0"/>
-              <a:t>6/30/18</a:t>
+            <a:fld id="{1832588A-8209-A345-87F1-BB413B639302}" type="datetime1">
+              <a:rPr lang="en-US" smtClean="0"/>
+              <a:t>8/25/18</a:t>
             </a:fld>
             <a:endParaRPr lang="en-US"/>
           </a:p>
@@ -5661,7 +5681,7 @@
           <a:p>
             <a:r>
               <a:rPr lang="en-US" smtClean="0"/>
-              <a:t>springboard capstone project - I</a:t>
+              <a:t>Bike Sharing Prediction</a:t>
             </a:r>
             <a:endParaRPr lang="en-US"/>
           </a:p>
@@ -5758,9 +5778,9 @@
           <a:bodyPr/>
           <a:lstStyle/>
           <a:p>
-            <a:fld id="{C796A040-D99B-734F-824A-C42646506EF6}" type="datetimeFigureOut">
-              <a:rPr lang="en-US" smtClean="0"/>
-              <a:t>6/30/18</a:t>
+            <a:fld id="{2E5432E1-CE13-964B-9B40-C44686B080E0}" type="datetime1">
+              <a:rPr lang="en-US" smtClean="0"/>
+              <a:t>8/25/18</a:t>
             </a:fld>
             <a:endParaRPr lang="en-US"/>
           </a:p>
@@ -5781,6 +5801,10 @@
           <a:bodyPr/>
           <a:lstStyle/>
           <a:p>
+            <a:r>
+              <a:rPr lang="en-US" smtClean="0"/>
+              <a:t>Bike Sharing Prediction</a:t>
+            </a:r>
             <a:endParaRPr lang="en-US"/>
           </a:p>
         </p:txBody>
@@ -5853,9 +5877,9 @@
           <a:bodyPr/>
           <a:lstStyle/>
           <a:p>
-            <a:fld id="{C796A040-D99B-734F-824A-C42646506EF6}" type="datetimeFigureOut">
-              <a:rPr lang="en-US" smtClean="0"/>
-              <a:t>6/30/18</a:t>
+            <a:fld id="{7BF8F0AF-CF1B-3045-BA94-C5FB50E1D74E}" type="datetime1">
+              <a:rPr lang="en-US" smtClean="0"/>
+              <a:t>8/25/18</a:t>
             </a:fld>
             <a:endParaRPr lang="en-US"/>
           </a:p>
@@ -5876,6 +5900,10 @@
           <a:bodyPr/>
           <a:lstStyle/>
           <a:p>
+            <a:r>
+              <a:rPr lang="en-US" smtClean="0"/>
+              <a:t>Bike Sharing Prediction</a:t>
+            </a:r>
             <a:endParaRPr lang="en-US"/>
           </a:p>
         </p:txBody>
@@ -6130,9 +6158,9 @@
           <a:bodyPr/>
           <a:lstStyle/>
           <a:p>
-            <a:fld id="{C796A040-D99B-734F-824A-C42646506EF6}" type="datetimeFigureOut">
-              <a:rPr lang="en-US" smtClean="0"/>
-              <a:t>6/30/18</a:t>
+            <a:fld id="{7AD001BE-0791-8C45-8E72-8F18924F655B}" type="datetime1">
+              <a:rPr lang="en-US" smtClean="0"/>
+              <a:t>8/25/18</a:t>
             </a:fld>
             <a:endParaRPr lang="en-US"/>
           </a:p>
@@ -6153,6 +6181,10 @@
           <a:bodyPr/>
           <a:lstStyle/>
           <a:p>
+            <a:r>
+              <a:rPr lang="en-US" smtClean="0"/>
+              <a:t>Bike Sharing Prediction</a:t>
+            </a:r>
             <a:endParaRPr lang="en-US"/>
           </a:p>
         </p:txBody>
@@ -6383,9 +6415,9 @@
           <a:bodyPr/>
           <a:lstStyle/>
           <a:p>
-            <a:fld id="{C796A040-D99B-734F-824A-C42646506EF6}" type="datetimeFigureOut">
-              <a:rPr lang="en-US" smtClean="0"/>
-              <a:t>6/30/18</a:t>
+            <a:fld id="{28ED87A7-AEDD-2940-9EEB-DC00771FDBDD}" type="datetime1">
+              <a:rPr lang="en-US" smtClean="0"/>
+              <a:t>8/25/18</a:t>
             </a:fld>
             <a:endParaRPr lang="en-US"/>
           </a:p>
@@ -6406,6 +6438,10 @@
           <a:bodyPr/>
           <a:lstStyle/>
           <a:p>
+            <a:r>
+              <a:rPr lang="en-US" smtClean="0"/>
+              <a:t>Bike Sharing Prediction</a:t>
+            </a:r>
             <a:endParaRPr lang="en-US"/>
           </a:p>
         </p:txBody>
@@ -6553,9 +6589,9 @@
           <a:bodyPr/>
           <a:lstStyle/>
           <a:p>
-            <a:fld id="{C796A040-D99B-734F-824A-C42646506EF6}" type="datetimeFigureOut">
-              <a:rPr lang="en-US" smtClean="0"/>
-              <a:t>6/30/18</a:t>
+            <a:fld id="{A3D93EF0-3FC3-5C45-B196-24E2EB84FA11}" type="datetime1">
+              <a:rPr lang="en-US" smtClean="0"/>
+              <a:t>8/25/18</a:t>
             </a:fld>
             <a:endParaRPr lang="en-US"/>
           </a:p>
@@ -6576,6 +6612,10 @@
           <a:bodyPr/>
           <a:lstStyle/>
           <a:p>
+            <a:r>
+              <a:rPr lang="en-US" smtClean="0"/>
+              <a:t>Bike Sharing Prediction</a:t>
+            </a:r>
             <a:endParaRPr lang="en-US"/>
           </a:p>
         </p:txBody>
@@ -6733,9 +6773,9 @@
           <a:bodyPr/>
           <a:lstStyle/>
           <a:p>
-            <a:fld id="{C796A040-D99B-734F-824A-C42646506EF6}" type="datetimeFigureOut">
-              <a:rPr lang="en-US" smtClean="0"/>
-              <a:t>6/30/18</a:t>
+            <a:fld id="{996F96AC-74C1-A544-A6C9-291A9067F5AD}" type="datetime1">
+              <a:rPr lang="en-US" smtClean="0"/>
+              <a:t>8/25/18</a:t>
             </a:fld>
             <a:endParaRPr lang="en-US"/>
           </a:p>
@@ -6756,6 +6796,10 @@
           <a:bodyPr/>
           <a:lstStyle/>
           <a:p>
+            <a:r>
+              <a:rPr lang="en-US" smtClean="0"/>
+              <a:t>Bike Sharing Prediction</a:t>
+            </a:r>
             <a:endParaRPr lang="en-US"/>
           </a:p>
         </p:txBody>
@@ -6973,9 +7017,9 @@
           <a:bodyPr/>
           <a:lstStyle/>
           <a:p>
-            <a:fld id="{32B5E43A-0538-3641-B1C0-894F281FD124}" type="datetime1">
-              <a:rPr lang="en-US" smtClean="0"/>
-              <a:t>6/30/18</a:t>
+            <a:fld id="{EC5678F6-D2BC-5D4C-989F-44268EC94EAD}" type="datetime1">
+              <a:rPr lang="en-US" smtClean="0"/>
+              <a:t>8/25/18</a:t>
             </a:fld>
             <a:endParaRPr lang="en-US"/>
           </a:p>
@@ -6998,7 +7042,7 @@
           <a:p>
             <a:r>
               <a:rPr lang="en-US" smtClean="0"/>
-              <a:t>springboard capstone project - I</a:t>
+              <a:t>Bike Sharing Prediction</a:t>
             </a:r>
             <a:endParaRPr lang="en-US"/>
           </a:p>
@@ -7352,9 +7396,9 @@
           <a:bodyPr/>
           <a:lstStyle/>
           <a:p>
-            <a:fld id="{94D83BEA-AF26-5042-B0FD-CC4464917E16}" type="datetime1">
-              <a:rPr lang="en-US" smtClean="0"/>
-              <a:t>6/30/18</a:t>
+            <a:fld id="{920E933B-92C0-2D45-BFFF-84A5B6CD45E1}" type="datetime1">
+              <a:rPr lang="en-US" smtClean="0"/>
+              <a:t>8/25/18</a:t>
             </a:fld>
             <a:endParaRPr lang="en-US"/>
           </a:p>
@@ -7377,7 +7421,7 @@
           <a:p>
             <a:r>
               <a:rPr lang="en-US" smtClean="0"/>
-              <a:t>springboard capstone project - I</a:t>
+              <a:t>Bike Sharing Prediction</a:t>
             </a:r>
             <a:endParaRPr lang="en-US"/>
           </a:p>
@@ -7482,9 +7526,9 @@
           <a:bodyPr/>
           <a:lstStyle/>
           <a:p>
-            <a:fld id="{7BDBB7FB-0C01-F44F-86D3-1AA030022633}" type="datetime1">
-              <a:rPr lang="en-US" smtClean="0"/>
-              <a:t>6/30/18</a:t>
+            <a:fld id="{93FB342B-72B7-C948-BB46-A9CB7242F593}" type="datetime1">
+              <a:rPr lang="en-US" smtClean="0"/>
+              <a:t>8/25/18</a:t>
             </a:fld>
             <a:endParaRPr lang="en-US"/>
           </a:p>
@@ -7507,7 +7551,7 @@
           <a:p>
             <a:r>
               <a:rPr lang="en-US" smtClean="0"/>
-              <a:t>springboard capstone project - I</a:t>
+              <a:t>Bike Sharing Prediction</a:t>
             </a:r>
             <a:endParaRPr lang="en-US"/>
           </a:p>
@@ -7596,9 +7640,9 @@
           <a:bodyPr/>
           <a:lstStyle/>
           <a:p>
-            <a:fld id="{FE80A9FC-21FB-AC41-8FCE-06961E44E875}" type="datetime1">
-              <a:rPr lang="en-US" smtClean="0"/>
-              <a:t>6/30/18</a:t>
+            <a:fld id="{7BAAE171-DEFF-0948-92A7-C17DED98327E}" type="datetime1">
+              <a:rPr lang="en-US" smtClean="0"/>
+              <a:t>8/25/18</a:t>
             </a:fld>
             <a:endParaRPr lang="en-US"/>
           </a:p>
@@ -7621,7 +7665,7 @@
           <a:p>
             <a:r>
               <a:rPr lang="en-US" smtClean="0"/>
-              <a:t>springboard capstone project - I</a:t>
+              <a:t>Bike Sharing Prediction</a:t>
             </a:r>
             <a:endParaRPr lang="en-US"/>
           </a:p>
@@ -7892,9 +7936,9 @@
           <a:bodyPr/>
           <a:lstStyle/>
           <a:p>
-            <a:fld id="{66FEF535-D6B9-024B-AE58-7A075C291EA6}" type="datetime1">
-              <a:rPr lang="en-US" smtClean="0"/>
-              <a:t>6/30/18</a:t>
+            <a:fld id="{CB327506-7F08-7549-9D55-921ABBC84807}" type="datetime1">
+              <a:rPr lang="en-US" smtClean="0"/>
+              <a:t>8/25/18</a:t>
             </a:fld>
             <a:endParaRPr lang="en-US"/>
           </a:p>
@@ -7917,7 +7961,7 @@
           <a:p>
             <a:r>
               <a:rPr lang="en-US" smtClean="0"/>
-              <a:t>springboard capstone project - I</a:t>
+              <a:t>Bike Sharing Prediction</a:t>
             </a:r>
             <a:endParaRPr lang="en-US"/>
           </a:p>
@@ -8157,9 +8201,9 @@
           <a:bodyPr/>
           <a:lstStyle/>
           <a:p>
-            <a:fld id="{1D441CEC-FAD7-4948-B52B-71BE83836950}" type="datetime1">
-              <a:rPr lang="en-US" smtClean="0"/>
-              <a:t>6/30/18</a:t>
+            <a:fld id="{EBB3A3DC-3247-7249-8214-415AE3C94836}" type="datetime1">
+              <a:rPr lang="en-US" smtClean="0"/>
+              <a:t>8/25/18</a:t>
             </a:fld>
             <a:endParaRPr lang="en-US"/>
           </a:p>
@@ -8182,7 +8226,7 @@
           <a:p>
             <a:r>
               <a:rPr lang="en-US" smtClean="0"/>
-              <a:t>springboard capstone project - I</a:t>
+              <a:t>Bike Sharing Prediction</a:t>
             </a:r>
             <a:endParaRPr lang="en-US"/>
           </a:p>
@@ -8383,7 +8427,7 @@
           <a:p>
             <a:r>
               <a:rPr lang="en-US" smtClean="0"/>
-              <a:t>springboard capstone project - I</a:t>
+              <a:t>Bike Sharing Prediction</a:t>
             </a:r>
             <a:endParaRPr lang="en-US"/>
           </a:p>
@@ -8892,9 +8936,9 @@
             </a:lvl1pPr>
           </a:lstStyle>
           <a:p>
-            <a:fld id="{A453D074-DB0F-B347-B37A-DF94F6702CEF}" type="datetime1">
-              <a:rPr lang="en-US" smtClean="0"/>
-              <a:t>6/30/18</a:t>
+            <a:fld id="{D44ADA6C-6403-C849-9DE6-EABAB289C0D4}" type="datetime1">
+              <a:rPr lang="en-US" smtClean="0"/>
+              <a:t>8/25/18</a:t>
             </a:fld>
             <a:endParaRPr lang="en-US"/>
           </a:p>
@@ -8935,7 +8979,7 @@
           <a:p>
             <a:r>
               <a:rPr lang="en-US" smtClean="0"/>
-              <a:t>springboard capstone project - I</a:t>
+              <a:t>Bike Sharing Prediction</a:t>
             </a:r>
             <a:endParaRPr lang="en-US"/>
           </a:p>
@@ -9442,9 +9486,9 @@
             </a:lvl1pPr>
           </a:lstStyle>
           <a:p>
-            <a:fld id="{C796A040-D99B-734F-824A-C42646506EF6}" type="datetimeFigureOut">
-              <a:rPr lang="en-US" smtClean="0"/>
-              <a:t>6/30/18</a:t>
+            <a:fld id="{1901E788-BA8B-3E4F-A9B5-5D1905597D98}" type="datetime1">
+              <a:rPr lang="en-US" smtClean="0"/>
+              <a:t>8/25/18</a:t>
             </a:fld>
             <a:endParaRPr lang="en-US"/>
           </a:p>
@@ -9483,6 +9527,10 @@
             </a:lvl1pPr>
           </a:lstStyle>
           <a:p>
+            <a:r>
+              <a:rPr lang="en-US" smtClean="0"/>
+              <a:t>Bike Sharing Prediction</a:t>
+            </a:r>
             <a:endParaRPr lang="en-US"/>
           </a:p>
         </p:txBody>
@@ -9556,6 +9604,7 @@
       </p:par>
     </p:tnLst>
   </p:timing>
+  <p:hf hdr="0" dt="0"/>
   <p:txStyles>
     <p:titleStyle>
       <a:lvl1pPr algn="l" defTabSz="914400" rtl="0" eaLnBrk="1" latinLnBrk="0" hangingPunct="1">
@@ -9898,9 +9947,39 @@
           <a:p>
             <a:r>
               <a:rPr lang="en-US" dirty="0" smtClean="0"/>
-              <a:t>Springboard Capstone Project - I</a:t>
+              <a:t>Project - I</a:t>
             </a:r>
             <a:endParaRPr lang="en-US" dirty="0"/>
+          </a:p>
+        </p:txBody>
+      </p:sp>
+      <p:sp>
+        <p:nvSpPr>
+          <p:cNvPr id="4" name="TextBox 3"/>
+          <p:cNvSpPr txBox="1"/>
+          <p:nvPr/>
+        </p:nvSpPr>
+        <p:spPr>
+          <a:xfrm>
+            <a:off x="5324346" y="4429919"/>
+            <a:ext cx="1543308" cy="369332"/>
+          </a:xfrm>
+          <a:prstGeom prst="rect">
+            <a:avLst/>
+          </a:prstGeom>
+          <a:noFill/>
+        </p:spPr>
+        <p:txBody>
+          <a:bodyPr wrap="none" rtlCol="0">
+            <a:spAutoFit/>
+          </a:bodyPr>
+          <a:lstStyle/>
+          <a:p>
+            <a:r>
+              <a:rPr lang="en-US" smtClean="0"/>
+              <a:t>Mudassir Syed</a:t>
+            </a:r>
+            <a:endParaRPr lang="en-US"/>
           </a:p>
         </p:txBody>
       </p:sp>
@@ -10135,8 +10214,8 @@
           <a:lstStyle/>
           <a:p>
             <a:r>
-              <a:rPr lang="en-US" dirty="0" smtClean="0"/>
-              <a:t>springboard capstone project - I</a:t>
+              <a:rPr lang="en-US" smtClean="0"/>
+              <a:t>Bike Sharing Prediction</a:t>
             </a:r>
             <a:endParaRPr lang="en-US" dirty="0"/>
           </a:p>
@@ -10396,7 +10475,7 @@
           <a:p>
             <a:r>
               <a:rPr lang="en-US" smtClean="0"/>
-              <a:t>springboard capstone project - I</a:t>
+              <a:t>Bike Sharing Prediction</a:t>
             </a:r>
             <a:endParaRPr lang="en-US"/>
           </a:p>
@@ -10571,7 +10650,7 @@
             <p:ph idx="1"/>
             <p:extLst>
               <p:ext uri="{D42A27DB-BD31-4B8C-83A1-F6EECF244321}">
-                <p14:modId xmlns:p14="http://schemas.microsoft.com/office/powerpoint/2010/main" val="542980605"/>
+                <p14:modId xmlns:p14="http://schemas.microsoft.com/office/powerpoint/2010/main" val="1727310314"/>
               </p:ext>
             </p:extLst>
           </p:nvPr>
@@ -10691,7 +10770,7 @@
                     <a:p>
                       <a:r>
                         <a:rPr lang="nb-NO" dirty="0" smtClean="0"/>
-                        <a:t>0.40</a:t>
+                        <a:t>0.159</a:t>
                       </a:r>
                       <a:endParaRPr lang="en-US" dirty="0"/>
                     </a:p>
@@ -10705,7 +10784,7 @@
                     <a:p>
                       <a:r>
                         <a:rPr lang="nb-NO" dirty="0" smtClean="0"/>
-                        <a:t>0.40</a:t>
+                        <a:t>0.158</a:t>
                       </a:r>
                       <a:endParaRPr lang="en-US" dirty="0"/>
                     </a:p>
@@ -10736,7 +10815,7 @@
                       </a:pPr>
                       <a:r>
                         <a:rPr lang="nb-NO" dirty="0" smtClean="0"/>
-                        <a:t>0.38</a:t>
+                        <a:t>0.18</a:t>
                       </a:r>
                       <a:endParaRPr lang="en-US" dirty="0" smtClean="0"/>
                     </a:p>
@@ -10787,8 +10866,8 @@
                     <a:lstStyle/>
                     <a:p>
                       <a:r>
-                        <a:rPr lang="hr-HR" dirty="0" smtClean="0"/>
-                        <a:t>139.97</a:t>
+                        <a:rPr lang="is-IS" dirty="0" smtClean="0"/>
+                        <a:t>143.74</a:t>
                       </a:r>
                       <a:endParaRPr lang="en-US" dirty="0"/>
                     </a:p>
@@ -10801,8 +10880,8 @@
                     <a:lstStyle/>
                     <a:p>
                       <a:r>
-                        <a:rPr lang="hr-HR" dirty="0" smtClean="0"/>
-                        <a:t>140.23</a:t>
+                        <a:rPr lang="is-IS" dirty="0" smtClean="0"/>
+                        <a:t>143.73</a:t>
                       </a:r>
                       <a:endParaRPr lang="en-US" dirty="0"/>
                     </a:p>
@@ -10832,8 +10911,8 @@
                         <a:defRPr/>
                       </a:pPr>
                       <a:r>
-                        <a:rPr lang="hr-HR" dirty="0" smtClean="0"/>
-                        <a:t>139.85</a:t>
+                        <a:rPr lang="is-IS" dirty="0" smtClean="0"/>
+                        <a:t>143.98</a:t>
                       </a:r>
                       <a:endParaRPr lang="en-US" dirty="0" smtClean="0"/>
                     </a:p>
@@ -10862,7 +10941,7 @@
           <a:p>
             <a:r>
               <a:rPr lang="en-US" smtClean="0"/>
-              <a:t>springboard capstone project - I</a:t>
+              <a:t>Bike Sharing Prediction</a:t>
             </a:r>
             <a:endParaRPr lang="en-US"/>
           </a:p>
@@ -11052,7 +11131,7 @@
           <a:p>
             <a:r>
               <a:rPr lang="en-US" smtClean="0"/>
-              <a:t>springboard capstone project - I</a:t>
+              <a:t>Bike Sharing Prediction</a:t>
             </a:r>
             <a:endParaRPr lang="en-US"/>
           </a:p>
@@ -11215,11 +11294,11 @@
             </a:pPr>
             <a:r>
               <a:rPr lang="en-US" sz="2200" dirty="0" smtClean="0"/>
-              <a:t>Random Forest regression with R^2 score of </a:t>
-            </a:r>
-            <a:r>
-              <a:rPr lang="en-US" sz="2200" dirty="0" smtClean="0"/>
-              <a:t>0.94 </a:t>
+              <a:t>Random Forest regression with R^2 score </a:t>
+            </a:r>
+            <a:r>
+              <a:rPr lang="en-US" sz="2200" smtClean="0"/>
+              <a:t>of 0.78 </a:t>
             </a:r>
             <a:r>
               <a:rPr lang="en-US" sz="2200" dirty="0" smtClean="0"/>
@@ -11237,7 +11316,7 @@
           <p:nvPr>
             <p:extLst>
               <p:ext uri="{D42A27DB-BD31-4B8C-83A1-F6EECF244321}">
-                <p14:modId xmlns:p14="http://schemas.microsoft.com/office/powerpoint/2010/main" val="120353030"/>
+                <p14:modId xmlns:p14="http://schemas.microsoft.com/office/powerpoint/2010/main" val="665264667"/>
               </p:ext>
             </p:extLst>
           </p:nvPr>
@@ -11337,7 +11416,7 @@
                     <a:p>
                       <a:r>
                         <a:rPr lang="nb-NO" dirty="0" smtClean="0"/>
-                        <a:t>0.90</a:t>
+                        <a:t>0.65</a:t>
                       </a:r>
                       <a:endParaRPr lang="en-US" dirty="0"/>
                     </a:p>
@@ -11350,8 +11429,8 @@
                     <a:lstStyle/>
                     <a:p>
                       <a:r>
-                        <a:rPr lang="it-IT" dirty="0" smtClean="0"/>
-                        <a:t>0.94</a:t>
+                        <a:rPr lang="nb-NO" dirty="0" smtClean="0"/>
+                        <a:t>0.789</a:t>
                       </a:r>
                       <a:endParaRPr lang="en-US" dirty="0"/>
                     </a:p>
@@ -11398,8 +11477,8 @@
                     <a:lstStyle/>
                     <a:p>
                       <a:r>
-                        <a:rPr lang="nb-NO" dirty="0" smtClean="0"/>
-                        <a:t>57.12</a:t>
+                        <a:rPr lang="hr-HR" dirty="0" smtClean="0"/>
+                        <a:t>84.81</a:t>
                       </a:r>
                       <a:endParaRPr lang="en-US" dirty="0"/>
                     </a:p>
@@ -11413,7 +11492,7 @@
                     <a:p>
                       <a:r>
                         <a:rPr lang="hr-HR" dirty="0" smtClean="0"/>
-                        <a:t>44.48</a:t>
+                        <a:t>63.86</a:t>
                       </a:r>
                       <a:endParaRPr lang="en-US" dirty="0"/>
                     </a:p>
@@ -11563,7 +11642,7 @@
           <a:p>
             <a:r>
               <a:rPr lang="en-US" smtClean="0"/>
-              <a:t>springboard capstone project - I</a:t>
+              <a:t>Bike Sharing Prediction</a:t>
             </a:r>
             <a:endParaRPr lang="en-US"/>
           </a:p>
@@ -11592,41 +11671,15 @@
           </a:p>
         </p:txBody>
       </p:sp>
-      <p:sp>
-        <p:nvSpPr>
-          <p:cNvPr id="3" name="Content Placeholder 2"/>
-          <p:cNvSpPr>
-            <a:spLocks noGrp="1"/>
-          </p:cNvSpPr>
-          <p:nvPr>
-            <p:ph idx="1"/>
-          </p:nvPr>
-        </p:nvSpPr>
-        <p:spPr>
-          <a:xfrm>
-            <a:off x="838200" y="1326592"/>
-            <a:ext cx="10996448" cy="5029758"/>
-          </a:xfrm>
-        </p:spPr>
-        <p:txBody>
-          <a:bodyPr/>
-          <a:lstStyle/>
-          <a:p>
-            <a:pPr>
-              <a:buFont typeface="Wingdings" charset="2"/>
-              <a:buChar char="Ø"/>
-            </a:pPr>
-            <a:endParaRPr lang="en-US" sz="1600" dirty="0" smtClean="0"/>
-          </a:p>
-        </p:txBody>
-      </p:sp>
       <p:pic>
         <p:nvPicPr>
-          <p:cNvPr id="10" name="Picture 9"/>
+          <p:cNvPr id="5" name="Content Placeholder 4"/>
           <p:cNvPicPr>
-            <a:picLocks noChangeAspect="1"/>
+            <a:picLocks noGrp="1" noChangeAspect="1"/>
           </p:cNvPicPr>
-          <p:nvPr/>
+          <p:nvPr>
+            <p:ph idx="1"/>
+          </p:nvPr>
         </p:nvPicPr>
         <p:blipFill>
           <a:blip r:embed="rId2">
@@ -11642,12 +11695,9 @@
         </p:blipFill>
         <p:spPr>
           <a:xfrm>
-            <a:off x="838200" y="1326591"/>
-            <a:ext cx="10996448" cy="5065247"/>
+            <a:off x="651641" y="1327150"/>
+            <a:ext cx="10289628" cy="5121698"/>
           </a:xfrm>
-          <a:prstGeom prst="rect">
-            <a:avLst/>
-          </a:prstGeom>
         </p:spPr>
       </p:pic>
       <p:sp>
@@ -11658,7 +11708,7 @@
         </p:nvSpPr>
         <p:spPr>
           <a:xfrm>
-            <a:off x="7872249" y="1576551"/>
+            <a:off x="6905298" y="1566040"/>
             <a:ext cx="3956404" cy="923330"/>
           </a:xfrm>
           <a:prstGeom prst="rect">
@@ -12062,7 +12112,7 @@
           <a:p>
             <a:r>
               <a:rPr lang="en-US" smtClean="0"/>
-              <a:t>springboard capstone project - I</a:t>
+              <a:t>Bike Sharing Prediction</a:t>
             </a:r>
             <a:endParaRPr lang="en-US"/>
           </a:p>
@@ -12157,9 +12207,9 @@
           <a:p>
             <a:r>
               <a:rPr lang="en-US" smtClean="0"/>
-              <a:t>springboard capstone project - I</a:t>
-            </a:r>
-            <a:endParaRPr lang="en-US"/>
+              <a:t>Bike Sharing Prediction</a:t>
+            </a:r>
+            <a:endParaRPr lang="en-US" dirty="0"/>
           </a:p>
         </p:txBody>
       </p:sp>
@@ -12516,9 +12566,9 @@
           <a:p>
             <a:r>
               <a:rPr lang="en-US" smtClean="0"/>
-              <a:t>springboard capstone project - I</a:t>
-            </a:r>
-            <a:endParaRPr lang="en-US"/>
+              <a:t>Bike Sharing Prediction</a:t>
+            </a:r>
+            <a:endParaRPr lang="en-US" dirty="0"/>
           </a:p>
         </p:txBody>
       </p:sp>
@@ -12846,7 +12896,7 @@
           <a:p>
             <a:r>
               <a:rPr lang="en-US" smtClean="0"/>
-              <a:t>springboard capstone project - I</a:t>
+              <a:t>Bike Sharing Prediction</a:t>
             </a:r>
             <a:endParaRPr lang="en-US"/>
           </a:p>
@@ -13096,7 +13146,7 @@
           <a:p>
             <a:r>
               <a:rPr lang="en-US" smtClean="0"/>
-              <a:t>springboard capstone project - I</a:t>
+              <a:t>Bike Sharing Prediction</a:t>
             </a:r>
             <a:endParaRPr lang="en-US"/>
           </a:p>
@@ -13347,7 +13397,7 @@
           <a:p>
             <a:r>
               <a:rPr lang="en-US" smtClean="0"/>
-              <a:t>springboard capstone project - I</a:t>
+              <a:t>Bike Sharing Prediction</a:t>
             </a:r>
             <a:endParaRPr lang="en-US"/>
           </a:p>
@@ -13476,7 +13526,7 @@
           <a:p>
             <a:r>
               <a:rPr lang="en-US" smtClean="0"/>
-              <a:t>springboard capstone project - I</a:t>
+              <a:t>Bike Sharing Prediction</a:t>
             </a:r>
             <a:endParaRPr lang="en-US"/>
           </a:p>
@@ -13902,7 +13952,7 @@
           <a:p>
             <a:r>
               <a:rPr lang="en-US" smtClean="0"/>
-              <a:t>springboard capstone project - I</a:t>
+              <a:t>Bike Sharing Prediction</a:t>
             </a:r>
             <a:endParaRPr lang="en-US"/>
           </a:p>
@@ -14057,7 +14107,7 @@
           <a:p>
             <a:r>
               <a:rPr lang="en-US" smtClean="0"/>
-              <a:t>springboard capstone project - I</a:t>
+              <a:t>Bike Sharing Prediction</a:t>
             </a:r>
             <a:endParaRPr lang="en-US"/>
           </a:p>
@@ -14456,7 +14506,7 @@
           <a:p>
             <a:r>
               <a:rPr lang="en-US" smtClean="0"/>
-              <a:t>springboard capstone project - I</a:t>
+              <a:t>Bike Sharing Prediction</a:t>
             </a:r>
             <a:endParaRPr lang="en-US"/>
           </a:p>

</xml_diff>